<commit_message>
Update slide; branch just messages
</commit_message>
<xml_diff>
--- a/slides/AffoghiamoIServiziNellaBirra.pptx
+++ b/slides/AffoghiamoIServiziNellaBirra.pptx
@@ -5,46 +5,47 @@
     <p:sldMasterId id="2147483660" r:id="rId1"/>
   </p:sldMasterIdLst>
   <p:notesMasterIdLst>
-    <p:notesMasterId r:id="rId9"/>
+    <p:notesMasterId r:id="rId10"/>
   </p:notesMasterIdLst>
   <p:handoutMasterIdLst>
-    <p:handoutMasterId r:id="rId10"/>
+    <p:handoutMasterId r:id="rId11"/>
   </p:handoutMasterIdLst>
   <p:sldIdLst>
     <p:sldId id="256" r:id="rId2"/>
     <p:sldId id="315" r:id="rId3"/>
-    <p:sldId id="282" r:id="rId4"/>
-    <p:sldId id="283" r:id="rId5"/>
-    <p:sldId id="324" r:id="rId6"/>
-    <p:sldId id="284" r:id="rId7"/>
-    <p:sldId id="325" r:id="rId8"/>
+    <p:sldId id="326" r:id="rId4"/>
+    <p:sldId id="282" r:id="rId5"/>
+    <p:sldId id="283" r:id="rId6"/>
+    <p:sldId id="324" r:id="rId7"/>
+    <p:sldId id="284" r:id="rId8"/>
+    <p:sldId id="325" r:id="rId9"/>
   </p:sldIdLst>
   <p:sldSz cx="9144000" cy="6858000" type="screen4x3"/>
   <p:notesSz cx="6858000" cy="9144000"/>
   <p:embeddedFontLst>
     <p:embeddedFont>
       <p:font typeface="Calibri" panose="020F0502020204030204" pitchFamily="34" charset="0"/>
-      <p:regular r:id="rId11"/>
-      <p:bold r:id="rId12"/>
-      <p:italic r:id="rId13"/>
-      <p:boldItalic r:id="rId14"/>
+      <p:regular r:id="rId12"/>
+      <p:bold r:id="rId13"/>
+      <p:italic r:id="rId14"/>
+      <p:boldItalic r:id="rId15"/>
     </p:embeddedFont>
     <p:embeddedFont>
       <p:font typeface="Calibri Light" panose="020F0302020204030204" pitchFamily="34" charset="0"/>
-      <p:regular r:id="rId15"/>
-      <p:italic r:id="rId16"/>
+      <p:regular r:id="rId16"/>
+      <p:italic r:id="rId17"/>
     </p:embeddedFont>
     <p:embeddedFont>
       <p:font typeface="Open Sans" panose="020B0606030504020204" pitchFamily="34" charset="0"/>
-      <p:regular r:id="rId17"/>
-      <p:bold r:id="rId18"/>
-      <p:italic r:id="rId19"/>
-      <p:boldItalic r:id="rId20"/>
+      <p:regular r:id="rId18"/>
+      <p:bold r:id="rId19"/>
+      <p:italic r:id="rId20"/>
+      <p:boldItalic r:id="rId21"/>
     </p:embeddedFont>
     <p:embeddedFont>
       <p:font typeface="Open Sans Light" panose="020B0306030504020204" pitchFamily="34" charset="0"/>
-      <p:regular r:id="rId21"/>
-      <p:italic r:id="rId22"/>
+      <p:regular r:id="rId22"/>
+      <p:italic r:id="rId23"/>
     </p:embeddedFont>
   </p:embeddedFontLst>
   <p:defaultTextStyle>
@@ -235,7 +236,7 @@
           <a:p>
             <a:fld id="{DC1D8630-9237-4BE7-9AFA-F1C8E44CEE44}" type="datetimeFigureOut">
               <a:rPr lang="it-IT" smtClean="0"/>
-              <a:t>26/06/2023</a:t>
+              <a:t>28/06/2023</a:t>
             </a:fld>
             <a:endParaRPr lang="it-IT"/>
           </a:p>
@@ -401,7 +402,7 @@
           <a:p>
             <a:fld id="{0B3F9ACC-C21F-4FB7-9E0A-95AB9ECDE2E6}" type="datetimeFigureOut">
               <a:rPr lang="it-IT" smtClean="0"/>
-              <a:t>26/06/2023</a:t>
+              <a:t>28/06/2023</a:t>
             </a:fld>
             <a:endParaRPr lang="it-IT"/>
           </a:p>
@@ -5093,6 +5094,259 @@
 <file path=ppt/slides/slide3.xml><?xml version="1.0" encoding="utf-8"?>
 <p:sld xmlns:a="http://schemas.openxmlformats.org/drawingml/2006/main" xmlns:r="http://schemas.openxmlformats.org/officeDocument/2006/relationships" xmlns:p="http://schemas.openxmlformats.org/presentationml/2006/main">
   <p:cSld>
+    <p:spTree>
+      <p:nvGrpSpPr>
+        <p:cNvPr id="1" name=""/>
+        <p:cNvGrpSpPr/>
+        <p:nvPr/>
+      </p:nvGrpSpPr>
+      <p:grpSpPr>
+        <a:xfrm>
+          <a:off x="0" y="0"/>
+          <a:ext cx="0" cy="0"/>
+          <a:chOff x="0" y="0"/>
+          <a:chExt cx="0" cy="0"/>
+        </a:xfrm>
+      </p:grpSpPr>
+      <p:sp>
+        <p:nvSpPr>
+          <p:cNvPr id="3" name="Titolo 2"/>
+          <p:cNvSpPr>
+            <a:spLocks noGrp="1"/>
+          </p:cNvSpPr>
+          <p:nvPr>
+            <p:ph type="ctrTitle" idx="4294967295"/>
+          </p:nvPr>
+        </p:nvSpPr>
+        <p:spPr>
+          <a:xfrm>
+            <a:off x="0" y="1154113"/>
+            <a:ext cx="2400300" cy="4460875"/>
+          </a:xfrm>
+          <a:prstGeom prst="rect">
+            <a:avLst/>
+          </a:prstGeom>
+        </p:spPr>
+        <p:txBody>
+          <a:bodyPr vert="horz" lIns="91440" tIns="45720" rIns="91440" bIns="45720" rtlCol="0" anchor="ctr">
+            <a:normAutofit/>
+          </a:bodyPr>
+          <a:lstStyle/>
+          <a:p>
+            <a:pPr>
+              <a:lnSpc>
+                <a:spcPct val="90000"/>
+              </a:lnSpc>
+            </a:pPr>
+            <a:r>
+              <a:rPr lang="en-US" sz="3400" kern="1200">
+                <a:solidFill>
+                  <a:srgbClr val="FFFFFF"/>
+                </a:solidFill>
+                <a:latin typeface="+mj-lt"/>
+                <a:ea typeface="+mj-ea"/>
+                <a:cs typeface="+mj-cs"/>
+              </a:rPr>
+              <a:t>NewVantage Report</a:t>
+            </a:r>
+          </a:p>
+        </p:txBody>
+      </p:sp>
+      <p:sp>
+        <p:nvSpPr>
+          <p:cNvPr id="16" name="Segnaposto piè di pagina 3">
+            <a:extLst>
+              <a:ext uri="{FF2B5EF4-FFF2-40B4-BE49-F238E27FC236}">
+                <a16:creationId xmlns:a16="http://schemas.microsoft.com/office/drawing/2014/main" id="{39474210-9556-5CB8-947F-BA3CDC558206}"/>
+              </a:ext>
+            </a:extLst>
+          </p:cNvPr>
+          <p:cNvSpPr txBox="1">
+            <a:spLocks/>
+          </p:cNvSpPr>
+          <p:nvPr/>
+        </p:nvSpPr>
+        <p:spPr>
+          <a:xfrm>
+            <a:off x="366122" y="6286803"/>
+            <a:ext cx="7196162" cy="519112"/>
+          </a:xfrm>
+          <a:prstGeom prst="rect">
+            <a:avLst/>
+          </a:prstGeom>
+        </p:spPr>
+        <p:txBody>
+          <a:bodyPr/>
+          <a:lstStyle>
+            <a:defPPr>
+              <a:defRPr lang="it-IT"/>
+            </a:defPPr>
+            <a:lvl1pPr marL="0" algn="l" defTabSz="914400" rtl="0" eaLnBrk="1" latinLnBrk="0" hangingPunct="1">
+              <a:defRPr sz="1800" kern="1200">
+                <a:solidFill>
+                  <a:schemeClr val="tx1"/>
+                </a:solidFill>
+                <a:latin typeface="+mn-lt"/>
+                <a:ea typeface="+mn-ea"/>
+                <a:cs typeface="+mn-cs"/>
+              </a:defRPr>
+            </a:lvl1pPr>
+            <a:lvl2pPr marL="457200" algn="l" defTabSz="914400" rtl="0" eaLnBrk="1" latinLnBrk="0" hangingPunct="1">
+              <a:defRPr sz="1800" kern="1200">
+                <a:solidFill>
+                  <a:schemeClr val="tx1"/>
+                </a:solidFill>
+                <a:latin typeface="+mn-lt"/>
+                <a:ea typeface="+mn-ea"/>
+                <a:cs typeface="+mn-cs"/>
+              </a:defRPr>
+            </a:lvl2pPr>
+            <a:lvl3pPr marL="914400" algn="l" defTabSz="914400" rtl="0" eaLnBrk="1" latinLnBrk="0" hangingPunct="1">
+              <a:defRPr sz="1800" kern="1200">
+                <a:solidFill>
+                  <a:schemeClr val="tx1"/>
+                </a:solidFill>
+                <a:latin typeface="+mn-lt"/>
+                <a:ea typeface="+mn-ea"/>
+                <a:cs typeface="+mn-cs"/>
+              </a:defRPr>
+            </a:lvl3pPr>
+            <a:lvl4pPr marL="1371600" algn="l" defTabSz="914400" rtl="0" eaLnBrk="1" latinLnBrk="0" hangingPunct="1">
+              <a:defRPr sz="1800" kern="1200">
+                <a:solidFill>
+                  <a:schemeClr val="tx1"/>
+                </a:solidFill>
+                <a:latin typeface="+mn-lt"/>
+                <a:ea typeface="+mn-ea"/>
+                <a:cs typeface="+mn-cs"/>
+              </a:defRPr>
+            </a:lvl4pPr>
+            <a:lvl5pPr marL="1828800" algn="l" defTabSz="914400" rtl="0" eaLnBrk="1" latinLnBrk="0" hangingPunct="1">
+              <a:defRPr sz="1800" kern="1200">
+                <a:solidFill>
+                  <a:schemeClr val="tx1"/>
+                </a:solidFill>
+                <a:latin typeface="+mn-lt"/>
+                <a:ea typeface="+mn-ea"/>
+                <a:cs typeface="+mn-cs"/>
+              </a:defRPr>
+            </a:lvl5pPr>
+            <a:lvl6pPr marL="2286000" algn="l" defTabSz="914400" rtl="0" eaLnBrk="1" latinLnBrk="0" hangingPunct="1">
+              <a:defRPr sz="1800" kern="1200">
+                <a:solidFill>
+                  <a:schemeClr val="tx1"/>
+                </a:solidFill>
+                <a:latin typeface="+mn-lt"/>
+                <a:ea typeface="+mn-ea"/>
+                <a:cs typeface="+mn-cs"/>
+              </a:defRPr>
+            </a:lvl6pPr>
+            <a:lvl7pPr marL="2743200" algn="l" defTabSz="914400" rtl="0" eaLnBrk="1" latinLnBrk="0" hangingPunct="1">
+              <a:defRPr sz="1800" kern="1200">
+                <a:solidFill>
+                  <a:schemeClr val="tx1"/>
+                </a:solidFill>
+                <a:latin typeface="+mn-lt"/>
+                <a:ea typeface="+mn-ea"/>
+                <a:cs typeface="+mn-cs"/>
+              </a:defRPr>
+            </a:lvl7pPr>
+            <a:lvl8pPr marL="3200400" algn="l" defTabSz="914400" rtl="0" eaLnBrk="1" latinLnBrk="0" hangingPunct="1">
+              <a:defRPr sz="1800" kern="1200">
+                <a:solidFill>
+                  <a:schemeClr val="tx1"/>
+                </a:solidFill>
+                <a:latin typeface="+mn-lt"/>
+                <a:ea typeface="+mn-ea"/>
+                <a:cs typeface="+mn-cs"/>
+              </a:defRPr>
+            </a:lvl8pPr>
+            <a:lvl9pPr marL="3657600" algn="l" defTabSz="914400" rtl="0" eaLnBrk="1" latinLnBrk="0" hangingPunct="1">
+              <a:defRPr sz="1800" kern="1200">
+                <a:solidFill>
+                  <a:schemeClr val="tx1"/>
+                </a:solidFill>
+                <a:latin typeface="+mn-lt"/>
+                <a:ea typeface="+mn-ea"/>
+                <a:cs typeface="+mn-cs"/>
+              </a:defRPr>
+            </a:lvl9pPr>
+          </a:lstStyle>
+          <a:p>
+            <a:pPr>
+              <a:defRPr/>
+            </a:pPr>
+            <a:r>
+              <a:rPr lang="it-IT" altLang="en-US"/>
+              <a:t>30/06/2023 – WorkingSoftware</a:t>
+            </a:r>
+            <a:endParaRPr lang="en-US" altLang="en-US" dirty="0"/>
+          </a:p>
+        </p:txBody>
+      </p:sp>
+      <p:pic>
+        <p:nvPicPr>
+          <p:cNvPr id="1026" name="Picture 2">
+            <a:extLst>
+              <a:ext uri="{FF2B5EF4-FFF2-40B4-BE49-F238E27FC236}">
+                <a16:creationId xmlns:a16="http://schemas.microsoft.com/office/drawing/2014/main" id="{47015768-0BF0-E8AA-FCB9-63861F0EC91B}"/>
+              </a:ext>
+            </a:extLst>
+          </p:cNvPr>
+          <p:cNvPicPr>
+            <a:picLocks noChangeAspect="1" noChangeArrowheads="1"/>
+          </p:cNvPicPr>
+          <p:nvPr/>
+        </p:nvPicPr>
+        <p:blipFill>
+          <a:blip r:embed="rId2">
+            <a:extLst>
+              <a:ext uri="{28A0092B-C50C-407E-A947-70E740481C1C}">
+                <a14:useLocalDpi xmlns:a14="http://schemas.microsoft.com/office/drawing/2010/main" val="0"/>
+              </a:ext>
+            </a:extLst>
+          </a:blip>
+          <a:srcRect/>
+          <a:stretch>
+            <a:fillRect/>
+          </a:stretch>
+        </p:blipFill>
+        <p:spPr bwMode="auto">
+          <a:xfrm>
+            <a:off x="1651240" y="317020"/>
+            <a:ext cx="5715719" cy="5577991"/>
+          </a:xfrm>
+          <a:prstGeom prst="rect">
+            <a:avLst/>
+          </a:prstGeom>
+          <a:noFill/>
+          <a:extLst>
+            <a:ext uri="{909E8E84-426E-40DD-AFC4-6F175D3DCCD1}">
+              <a14:hiddenFill xmlns:a14="http://schemas.microsoft.com/office/drawing/2010/main">
+                <a:solidFill>
+                  <a:srgbClr val="FFFFFF"/>
+                </a:solidFill>
+              </a14:hiddenFill>
+            </a:ext>
+          </a:extLst>
+        </p:spPr>
+      </p:pic>
+    </p:spTree>
+    <p:extLst>
+      <p:ext uri="{BB962C8B-B14F-4D97-AF65-F5344CB8AC3E}">
+        <p14:creationId xmlns:p14="http://schemas.microsoft.com/office/powerpoint/2010/main" val="3770576387"/>
+      </p:ext>
+    </p:extLst>
+  </p:cSld>
+  <p:clrMapOvr>
+    <a:masterClrMapping/>
+  </p:clrMapOvr>
+</p:sld>
+</file>
+
+<file path=ppt/slides/slide4.xml><?xml version="1.0" encoding="utf-8"?>
+<p:sld xmlns:a="http://schemas.openxmlformats.org/drawingml/2006/main" xmlns:r="http://schemas.openxmlformats.org/officeDocument/2006/relationships" xmlns:p="http://schemas.openxmlformats.org/presentationml/2006/main">
+  <p:cSld>
     <p:bg>
       <p:bgPr>
         <a:solidFill>
@@ -6401,7 +6655,7 @@
 </p:sld>
 </file>
 
-<file path=ppt/slides/slide4.xml><?xml version="1.0" encoding="utf-8"?>
+<file path=ppt/slides/slide5.xml><?xml version="1.0" encoding="utf-8"?>
 <p:sld xmlns:a="http://schemas.openxmlformats.org/drawingml/2006/main" xmlns:r="http://schemas.openxmlformats.org/officeDocument/2006/relationships" xmlns:p="http://schemas.openxmlformats.org/presentationml/2006/main">
   <p:cSld>
     <p:bg>
@@ -7844,7 +8098,7 @@
 </p:sld>
 </file>
 
-<file path=ppt/slides/slide5.xml><?xml version="1.0" encoding="utf-8"?>
+<file path=ppt/slides/slide6.xml><?xml version="1.0" encoding="utf-8"?>
 <p:sld xmlns:a="http://schemas.openxmlformats.org/drawingml/2006/main" xmlns:r="http://schemas.openxmlformats.org/officeDocument/2006/relationships" xmlns:p="http://schemas.openxmlformats.org/presentationml/2006/main">
   <p:cSld>
     <p:bg>
@@ -7953,7 +8207,7 @@
 </p:sld>
 </file>
 
-<file path=ppt/slides/slide6.xml><?xml version="1.0" encoding="utf-8"?>
+<file path=ppt/slides/slide7.xml><?xml version="1.0" encoding="utf-8"?>
 <p:sld xmlns:a="http://schemas.openxmlformats.org/drawingml/2006/main" xmlns:r="http://schemas.openxmlformats.org/officeDocument/2006/relationships" xmlns:p="http://schemas.openxmlformats.org/presentationml/2006/main">
   <p:cSld>
     <p:bg>
@@ -8168,7 +8422,7 @@
 </p:sld>
 </file>
 
-<file path=ppt/slides/slide7.xml><?xml version="1.0" encoding="utf-8"?>
+<file path=ppt/slides/slide8.xml><?xml version="1.0" encoding="utf-8"?>
 <p:sld xmlns:a="http://schemas.openxmlformats.org/drawingml/2006/main" xmlns:r="http://schemas.openxmlformats.org/officeDocument/2006/relationships" xmlns:p="http://schemas.openxmlformats.org/presentationml/2006/main">
   <p:cSld>
     <p:spTree>

</xml_diff>